<commit_message>
VAI VAI VAI VAAAI
</commit_message>
<xml_diff>
--- a/SPRINT2/Gráfico de temperatura.pptx
+++ b/SPRINT2/Gráfico de temperatura.pptx
@@ -5,7 +5,7 @@
     <p:sldMasterId id="2147483677" r:id="rId1"/>
   </p:sldMasterIdLst>
   <p:notesMasterIdLst>
-    <p:notesMasterId r:id="rId9"/>
+    <p:notesMasterId r:id="rId10"/>
   </p:notesMasterIdLst>
   <p:sldIdLst>
     <p:sldId id="256" r:id="rId2"/>
@@ -13,33 +13,34 @@
     <p:sldId id="258" r:id="rId4"/>
     <p:sldId id="262" r:id="rId5"/>
     <p:sldId id="310" r:id="rId6"/>
-    <p:sldId id="260" r:id="rId7"/>
-    <p:sldId id="311" r:id="rId8"/>
+    <p:sldId id="312" r:id="rId7"/>
+    <p:sldId id="260" r:id="rId8"/>
+    <p:sldId id="311" r:id="rId9"/>
   </p:sldIdLst>
   <p:sldSz cx="9144000" cy="5143500" type="screen16x9"/>
   <p:notesSz cx="6858000" cy="9144000"/>
   <p:embeddedFontLst>
     <p:embeddedFont>
       <p:font typeface="Righteous" panose="020B0604020202020204" charset="0"/>
-      <p:regular r:id="rId10"/>
+      <p:regular r:id="rId11"/>
     </p:embeddedFont>
     <p:embeddedFont>
       <p:font typeface="Varela Round" panose="020B0604020202020204" charset="-79"/>
-      <p:regular r:id="rId11"/>
+      <p:regular r:id="rId12"/>
     </p:embeddedFont>
     <p:embeddedFont>
       <p:font typeface="Work Sans" panose="020B0604020202020204" charset="0"/>
-      <p:regular r:id="rId12"/>
-      <p:bold r:id="rId13"/>
-      <p:italic r:id="rId14"/>
-      <p:boldItalic r:id="rId15"/>
+      <p:regular r:id="rId13"/>
+      <p:bold r:id="rId14"/>
+      <p:italic r:id="rId15"/>
+      <p:boldItalic r:id="rId16"/>
     </p:embeddedFont>
     <p:embeddedFont>
       <p:font typeface="Work Sans Regular" panose="020B0604020202020204" charset="0"/>
-      <p:regular r:id="rId16"/>
-      <p:bold r:id="rId17"/>
-      <p:italic r:id="rId18"/>
-      <p:boldItalic r:id="rId19"/>
+      <p:regular r:id="rId17"/>
+      <p:bold r:id="rId18"/>
+      <p:italic r:id="rId19"/>
+      <p:boldItalic r:id="rId20"/>
     </p:embeddedFont>
   </p:embeddedFontLst>
   <p:defaultTextStyle>
@@ -8172,6 +8173,66 @@
   <p:cSld>
     <p:spTree>
       <p:nvGrpSpPr>
+        <p:cNvPr id="1" name=""/>
+        <p:cNvGrpSpPr/>
+        <p:nvPr/>
+      </p:nvGrpSpPr>
+      <p:grpSpPr>
+        <a:xfrm>
+          <a:off x="0" y="0"/>
+          <a:ext cx="0" cy="0"/>
+          <a:chOff x="0" y="0"/>
+          <a:chExt cx="0" cy="0"/>
+        </a:xfrm>
+      </p:grpSpPr>
+      <p:pic>
+        <p:nvPicPr>
+          <p:cNvPr id="4" name="Imagem 3">
+            <a:extLst>
+              <a:ext uri="{FF2B5EF4-FFF2-40B4-BE49-F238E27FC236}">
+                <a16:creationId xmlns:a16="http://schemas.microsoft.com/office/drawing/2014/main" id="{BDFB139D-BB31-4E98-8D41-687D2FB341B7}"/>
+              </a:ext>
+            </a:extLst>
+          </p:cNvPr>
+          <p:cNvPicPr>
+            <a:picLocks noChangeAspect="1"/>
+          </p:cNvPicPr>
+          <p:nvPr/>
+        </p:nvPicPr>
+        <p:blipFill>
+          <a:blip r:embed="rId2"/>
+          <a:stretch>
+            <a:fillRect/>
+          </a:stretch>
+        </p:blipFill>
+        <p:spPr>
+          <a:xfrm>
+            <a:off x="1147587" y="2109787"/>
+            <a:ext cx="7029450" cy="923925"/>
+          </a:xfrm>
+          <a:prstGeom prst="rect">
+            <a:avLst/>
+          </a:prstGeom>
+        </p:spPr>
+      </p:pic>
+    </p:spTree>
+    <p:extLst>
+      <p:ext uri="{BB962C8B-B14F-4D97-AF65-F5344CB8AC3E}">
+        <p14:creationId xmlns:p14="http://schemas.microsoft.com/office/powerpoint/2010/main" val="1003176752"/>
+      </p:ext>
+    </p:extLst>
+  </p:cSld>
+  <p:clrMapOvr>
+    <a:masterClrMapping/>
+  </p:clrMapOvr>
+</p:sld>
+</file>
+
+<file path=ppt/slides/slide7.xml><?xml version="1.0" encoding="utf-8"?>
+<p:sld xmlns:a="http://schemas.openxmlformats.org/drawingml/2006/main" xmlns:r="http://schemas.openxmlformats.org/officeDocument/2006/relationships" xmlns:p="http://schemas.openxmlformats.org/presentationml/2006/main">
+  <p:cSld>
+    <p:spTree>
+      <p:nvGrpSpPr>
         <p:cNvPr id="1" name="Shape 205"/>
         <p:cNvGrpSpPr/>
         <p:nvPr/>
@@ -8408,7 +8469,7 @@
 </p:sld>
 </file>
 
-<file path=ppt/slides/slide7.xml><?xml version="1.0" encoding="utf-8"?>
+<file path=ppt/slides/slide8.xml><?xml version="1.0" encoding="utf-8"?>
 <p:sld xmlns:a="http://schemas.openxmlformats.org/drawingml/2006/main" xmlns:r="http://schemas.openxmlformats.org/officeDocument/2006/relationships" xmlns:p="http://schemas.openxmlformats.org/presentationml/2006/main">
   <p:cSld>
     <p:bg>

</xml_diff>